<commit_message>
Update Something in doc
</commit_message>
<xml_diff>
--- a/doc/PRESENTATIONS/PRESENT_2_Detail Proporsal/상세명세서 발표자료_9팀.pptx
+++ b/doc/PRESENTATIONS/PRESENT_2_Detail Proporsal/상세명세서 발표자료_9팀.pptx
@@ -213,7 +213,7 @@
           <a:p>
             <a:fld id="{6D5C3B1A-4279-8B4F-B8AC-13C6464BB530}" type="datetimeFigureOut">
               <a:rPr kumimoji="1" lang="ko-Kore-KR" altLang="en-US" smtClean="0"/>
-              <a:t>2020. 11. 14.</a:t>
+              <a:t>2020. 11. 19.</a:t>
             </a:fld>
             <a:endParaRPr kumimoji="1" lang="ko-Kore-KR" altLang="en-US"/>
           </a:p>
@@ -2081,176 +2081,6 @@
           <a:bodyPr/>
           <a:lstStyle/>
           <a:p>
-            <a:r>
-              <a:rPr kumimoji="1" lang="ko-KR" altLang="en-US" dirty="0"/>
-              <a:t>중간고사 이전에 주요한 모듈에 대한 </a:t>
-            </a:r>
-            <a:r>
-              <a:rPr kumimoji="1" lang="ko-KR" altLang="en-US" dirty="0" err="1"/>
-              <a:t>프로토</a:t>
-            </a:r>
-            <a:r>
-              <a:rPr kumimoji="1" lang="ko-KR" altLang="en-US" dirty="0"/>
-              <a:t> 타입 개발을 이미 완료했고</a:t>
-            </a:r>
-            <a:r>
-              <a:rPr kumimoji="1" lang="en-US" altLang="ko-KR" dirty="0"/>
-              <a:t>,</a:t>
-            </a:r>
-            <a:r>
-              <a:rPr kumimoji="1" lang="ko-KR" altLang="en-US" dirty="0"/>
-              <a:t> 현재 </a:t>
-            </a:r>
-            <a:r>
-              <a:rPr kumimoji="1" lang="en-US" altLang="ko-KR" dirty="0"/>
-              <a:t>version01</a:t>
-            </a:r>
-            <a:r>
-              <a:rPr kumimoji="1" lang="ko-KR" altLang="en-US" dirty="0"/>
-              <a:t>에 대해서 모듈 통합까지 완료됨을 알림</a:t>
-            </a:r>
-            <a:r>
-              <a:rPr kumimoji="1" lang="en-US" altLang="ko-KR" dirty="0"/>
-              <a:t>.</a:t>
-            </a:r>
-          </a:p>
-          <a:p>
-            <a:r>
-              <a:rPr kumimoji="1" lang="ko-KR" altLang="en-US" dirty="0"/>
-              <a:t>지금도 </a:t>
-            </a:r>
-            <a:r>
-              <a:rPr kumimoji="1" lang="en-US" altLang="ko-KR" dirty="0"/>
-              <a:t>version01</a:t>
-            </a:r>
-            <a:r>
-              <a:rPr kumimoji="1" lang="ko-KR" altLang="en-US" dirty="0"/>
-              <a:t>의 </a:t>
-            </a:r>
-            <a:r>
-              <a:rPr kumimoji="1" lang="en-US" altLang="ko-KR" dirty="0"/>
-              <a:t>backlog</a:t>
-            </a:r>
-            <a:r>
-              <a:rPr kumimoji="1" lang="ko-KR" altLang="en-US" dirty="0" err="1"/>
-              <a:t>를</a:t>
-            </a:r>
-            <a:r>
-              <a:rPr kumimoji="1" lang="ko-KR" altLang="en-US" dirty="0"/>
-              <a:t> 취합하고 있으며</a:t>
-            </a:r>
-            <a:r>
-              <a:rPr kumimoji="1" lang="en-US" altLang="ko-KR" dirty="0"/>
-              <a:t>,</a:t>
-            </a:r>
-            <a:r>
-              <a:rPr kumimoji="1" lang="ko-KR" altLang="en-US" dirty="0"/>
-              <a:t> </a:t>
-            </a:r>
-            <a:r>
-              <a:rPr kumimoji="1" lang="en-US" altLang="ko-KR" dirty="0"/>
-              <a:t>version02</a:t>
-            </a:r>
-            <a:r>
-              <a:rPr kumimoji="1" lang="ko-KR" altLang="en-US" dirty="0"/>
-              <a:t>의 경우 팀원들의 학사일정을 고려하여 </a:t>
-            </a:r>
-            <a:r>
-              <a:rPr kumimoji="1" lang="ko-KR" altLang="en-US" dirty="0" err="1"/>
-              <a:t>갈등조정을</a:t>
-            </a:r>
-            <a:r>
-              <a:rPr kumimoji="1" lang="ko-KR" altLang="en-US" dirty="0"/>
-              <a:t> 위해 넉넉히 일정을 잡음</a:t>
-            </a:r>
-            <a:r>
-              <a:rPr kumimoji="1" lang="en-US" altLang="ko-KR" dirty="0"/>
-              <a:t>.</a:t>
-            </a:r>
-          </a:p>
-          <a:p>
-            <a:r>
-              <a:rPr kumimoji="1" lang="ko-KR" altLang="en-US" dirty="0"/>
-              <a:t>실제 </a:t>
-            </a:r>
-            <a:r>
-              <a:rPr kumimoji="1" lang="en-US" altLang="ko-KR" dirty="0"/>
-              <a:t>version01</a:t>
-            </a:r>
-            <a:r>
-              <a:rPr kumimoji="1" lang="ko-KR" altLang="en-US" dirty="0"/>
-              <a:t>의 </a:t>
-            </a:r>
-            <a:r>
-              <a:rPr kumimoji="1" lang="en-US" altLang="ko-KR" dirty="0"/>
-              <a:t>sprint</a:t>
-            </a:r>
-            <a:r>
-              <a:rPr kumimoji="1" lang="ko-KR" altLang="en-US" dirty="0"/>
-              <a:t> </a:t>
-            </a:r>
-            <a:r>
-              <a:rPr kumimoji="1" lang="ko-KR" altLang="en-US" dirty="0" err="1"/>
-              <a:t>기간동안</a:t>
-            </a:r>
-            <a:r>
-              <a:rPr kumimoji="1" lang="ko-KR" altLang="en-US" dirty="0"/>
-              <a:t> 중간고사 준비시간이 넉넉지 않다는 팀원들 간의 지적이 나왔고</a:t>
-            </a:r>
-            <a:r>
-              <a:rPr kumimoji="1" lang="en-US" altLang="ko-KR" dirty="0"/>
-              <a:t>,</a:t>
-            </a:r>
-            <a:r>
-              <a:rPr kumimoji="1" lang="ko-KR" altLang="en-US" dirty="0"/>
-              <a:t> 그에 대한 해결방안이라고 생각함</a:t>
-            </a:r>
-            <a:r>
-              <a:rPr kumimoji="1" lang="en-US" altLang="ko-KR" dirty="0"/>
-              <a:t>.</a:t>
-            </a:r>
-          </a:p>
-          <a:p>
-            <a:r>
-              <a:rPr kumimoji="1" lang="en-US" altLang="ko-KR" dirty="0"/>
-              <a:t>version01</a:t>
-            </a:r>
-            <a:r>
-              <a:rPr kumimoji="1" lang="ko-KR" altLang="en-US" dirty="0"/>
-              <a:t> 이후 팀원들과 모여서 치킨을 먹으며 서로간의 </a:t>
-            </a:r>
-            <a:r>
-              <a:rPr kumimoji="1" lang="ko-KR" altLang="en-US" dirty="0" err="1"/>
-              <a:t>느낀점과</a:t>
-            </a:r>
-            <a:r>
-              <a:rPr kumimoji="1" lang="ko-KR" altLang="en-US" dirty="0"/>
-              <a:t> </a:t>
-            </a:r>
-            <a:r>
-              <a:rPr kumimoji="1" lang="en-US" altLang="ko-KR" dirty="0"/>
-              <a:t>version02</a:t>
-            </a:r>
-            <a:r>
-              <a:rPr kumimoji="1" lang="ko-KR" altLang="en-US" dirty="0"/>
-              <a:t> </a:t>
-            </a:r>
-            <a:r>
-              <a:rPr kumimoji="1" lang="en-US" altLang="ko-KR" dirty="0"/>
-              <a:t>sprint</a:t>
-            </a:r>
-            <a:r>
-              <a:rPr kumimoji="1" lang="ko-KR" altLang="en-US" dirty="0" err="1"/>
-              <a:t>를</a:t>
-            </a:r>
-            <a:r>
-              <a:rPr kumimoji="1" lang="ko-KR" altLang="en-US" dirty="0"/>
-              <a:t> 시작했을 때 서로에 대한 요구사항들을 공유하는 시간을 가짐</a:t>
-            </a:r>
-            <a:r>
-              <a:rPr kumimoji="1" lang="en-US" altLang="ko-KR" dirty="0"/>
-              <a:t>.</a:t>
-            </a:r>
             <a:endParaRPr kumimoji="1" lang="ko-Kore-KR" altLang="en-US" dirty="0"/>
           </a:p>
         </p:txBody>
@@ -3242,7 +3072,7 @@
                 </a:solidFill>
               </a:rPr>
               <a:pPr/>
-              <a:t>2020. 11. 14.</a:t>
+              <a:t>2020. 11. 19.</a:t>
             </a:fld>
             <a:endParaRPr lang="ko-KR" altLang="en-US">
               <a:solidFill>
@@ -3472,7 +3302,7 @@
                 </a:solidFill>
               </a:rPr>
               <a:pPr/>
-              <a:t>2020. 11. 14.</a:t>
+              <a:t>2020. 11. 19.</a:t>
             </a:fld>
             <a:endParaRPr lang="ko-KR" altLang="en-US">
               <a:solidFill>
@@ -3712,7 +3542,7 @@
                 </a:solidFill>
               </a:rPr>
               <a:pPr/>
-              <a:t>2020. 11. 14.</a:t>
+              <a:t>2020. 11. 19.</a:t>
             </a:fld>
             <a:endParaRPr lang="ko-KR" altLang="en-US">
               <a:solidFill>
@@ -3942,7 +3772,7 @@
                 </a:solidFill>
               </a:rPr>
               <a:pPr/>
-              <a:t>2020. 11. 14.</a:t>
+              <a:t>2020. 11. 19.</a:t>
             </a:fld>
             <a:endParaRPr lang="ko-KR" altLang="en-US">
               <a:solidFill>
@@ -4249,7 +4079,7 @@
                 </a:solidFill>
               </a:rPr>
               <a:pPr/>
-              <a:t>2020. 11. 14.</a:t>
+              <a:t>2020. 11. 19.</a:t>
             </a:fld>
             <a:endParaRPr lang="ko-KR" altLang="en-US">
               <a:solidFill>
@@ -4546,7 +4376,7 @@
                 </a:solidFill>
               </a:rPr>
               <a:pPr/>
-              <a:t>2020. 11. 14.</a:t>
+              <a:t>2020. 11. 19.</a:t>
             </a:fld>
             <a:endParaRPr lang="ko-KR" altLang="en-US">
               <a:solidFill>
@@ -4990,7 +4820,7 @@
                 </a:solidFill>
               </a:rPr>
               <a:pPr/>
-              <a:t>2020. 11. 14.</a:t>
+              <a:t>2020. 11. 19.</a:t>
             </a:fld>
             <a:endParaRPr lang="ko-KR" altLang="en-US">
               <a:solidFill>
@@ -5163,7 +4993,7 @@
                 </a:solidFill>
               </a:rPr>
               <a:pPr/>
-              <a:t>2020. 11. 14.</a:t>
+              <a:t>2020. 11. 19.</a:t>
             </a:fld>
             <a:endParaRPr lang="ko-KR" altLang="en-US">
               <a:solidFill>
@@ -5308,7 +5138,7 @@
                 </a:solidFill>
               </a:rPr>
               <a:pPr/>
-              <a:t>2020. 11. 14.</a:t>
+              <a:t>2020. 11. 19.</a:t>
             </a:fld>
             <a:endParaRPr lang="ko-KR" altLang="en-US">
               <a:solidFill>
@@ -5651,7 +5481,7 @@
                 </a:solidFill>
               </a:rPr>
               <a:pPr/>
-              <a:t>2020. 11. 14.</a:t>
+              <a:t>2020. 11. 19.</a:t>
             </a:fld>
             <a:endParaRPr lang="ko-KR" altLang="en-US">
               <a:solidFill>
@@ -5971,7 +5801,7 @@
                 </a:solidFill>
               </a:rPr>
               <a:pPr/>
-              <a:t>2020. 11. 14.</a:t>
+              <a:t>2020. 11. 19.</a:t>
             </a:fld>
             <a:endParaRPr lang="ko-KR" altLang="en-US">
               <a:solidFill>
@@ -6244,7 +6074,7 @@
                 </a:solidFill>
               </a:rPr>
               <a:pPr/>
-              <a:t>2020. 11. 14.</a:t>
+              <a:t>2020. 11. 19.</a:t>
             </a:fld>
             <a:endParaRPr lang="ko-KR" altLang="en-US">
               <a:solidFill>
@@ -9892,10 +9722,10 @@
       </p:sp>
       <p:pic>
         <p:nvPicPr>
-          <p:cNvPr id="3" name="그림 2" descr="테이블이(가) 표시된 사진&#10;&#10;자동 생성된 설명">
-            <a:extLst>
-              <a:ext uri="{FF2B5EF4-FFF2-40B4-BE49-F238E27FC236}">
-                <a16:creationId xmlns:a16="http://schemas.microsoft.com/office/drawing/2014/main" id="{755C3770-142D-6C40-9B15-24319BBB6C6E}"/>
+          <p:cNvPr id="4" name="그래픽 3" descr="클립보드 혼합됨">
+            <a:extLst>
+              <a:ext uri="{FF2B5EF4-FFF2-40B4-BE49-F238E27FC236}">
+                <a16:creationId xmlns:a16="http://schemas.microsoft.com/office/drawing/2014/main" id="{5A367B4A-8AA4-2649-AD59-2BBDFCC11A9E}"/>
               </a:ext>
             </a:extLst>
           </p:cNvPr>
@@ -9910,6 +9740,9 @@
               <a:ext uri="{28A0092B-C50C-407E-A947-70E740481C1C}">
                 <a14:useLocalDpi xmlns:a14="http://schemas.microsoft.com/office/drawing/2010/main" val="0"/>
               </a:ext>
+              <a:ext uri="{96DAC541-7B7A-43D3-8B79-37D633B846F1}">
+                <asvg:svgBlip xmlns:asvg="http://schemas.microsoft.com/office/drawing/2016/SVG/main" r:embed="rId4"/>
+              </a:ext>
             </a:extLst>
           </a:blip>
           <a:stretch>
@@ -9918,8 +9751,8 @@
         </p:blipFill>
         <p:spPr>
           <a:xfrm>
-            <a:off x="3584482" y="1529420"/>
-            <a:ext cx="5023035" cy="4675459"/>
+            <a:off x="3899985" y="1656566"/>
+            <a:ext cx="4038383" cy="4038383"/>
           </a:xfrm>
           <a:prstGeom prst="rect">
             <a:avLst/>

</xml_diff>